<commit_message>
update dates and links
</commit_message>
<xml_diff>
--- a/powerpoint/Session1.pptx
+++ b/powerpoint/Session1.pptx
@@ -20013,7 +20013,7 @@
                 <a:latin typeface="Calibri"/>
                 <a:ea typeface="DejaVu Sans"/>
               </a:rPr>
-              <a:t>Hilary 2023</a:t>
+              <a:t>Trinity 2023</a:t>
             </a:r>
             <a:endParaRPr lang="en-GB" sz="3200" b="0" strike="noStrike" spc="-1" dirty="0">
               <a:latin typeface="Arial"/>
@@ -34324,19 +34324,9 @@
                 <a:latin typeface="Calibri"/>
                 <a:hlinkClick r:id="rId2"/>
               </a:rPr>
-              <a:t>https://github.com/sraorao</a:t>
+              <a:t>https://github.com/sraorao/MSD_R_course_TT2023</a:t>
             </a:r>
-            <a:r>
-              <a:rPr lang="en-US" sz="3600" spc="-1">
-                <a:solidFill>
-                  <a:srgbClr val="000000"/>
-                </a:solidFill>
-                <a:latin typeface="Calibri"/>
-                <a:hlinkClick r:id="rId2"/>
-              </a:rPr>
-              <a:t>/MSD_R_course_HT2023</a:t>
-            </a:r>
-            <a:endParaRPr lang="en-US" sz="3600" spc="-1">
+            <a:endParaRPr lang="en-US" sz="3600" spc="-1" dirty="0">
               <a:solidFill>
                 <a:srgbClr val="000000"/>
               </a:solidFill>
@@ -34362,16 +34352,6 @@
               <a:buChar char="•"/>
             </a:pPr>
             <a:r>
-              <a:rPr lang="en-US" sz="3600" b="0" strike="noStrike" spc="-1">
-                <a:solidFill>
-                  <a:srgbClr val="000000"/>
-                </a:solidFill>
-                <a:latin typeface="Calibri"/>
-                <a:ea typeface="DejaVu Sans"/>
-              </a:rPr>
-              <a:t>Screen </a:t>
-            </a:r>
-            <a:r>
               <a:rPr lang="en-US" sz="3600" b="0" strike="noStrike" spc="-1" dirty="0">
                 <a:solidFill>
                   <a:srgbClr val="000000"/>
@@ -34379,7 +34359,7 @@
                 <a:latin typeface="Calibri"/>
                 <a:ea typeface="DejaVu Sans"/>
               </a:rPr>
-              <a:t>sharing</a:t>
+              <a:t>Screen sharing</a:t>
             </a:r>
             <a:endParaRPr lang="en-GB" sz="3600" b="0" strike="noStrike" spc="-1" dirty="0">
               <a:latin typeface="Arial"/>

</xml_diff>